<commit_message>
all the points are added.
</commit_message>
<xml_diff>
--- a/ppt/golang/interview_questions/6/constant.pptx
+++ b/ppt/golang/interview_questions/6/constant.pptx
@@ -463,7 +463,7 @@
           <a:p>
             <a:fld id="{5BCAD085-E8A6-8845-BD4E-CB4CCA059FC4}" type="datetimeFigureOut">
               <a:rPr lang="en-US" smtClean="0"/>
-              <a:t>6/24/2025</a:t>
+              <a:t>6/25/2025</a:t>
             </a:fld>
             <a:endParaRPr lang="en-US"/>
           </a:p>
@@ -787,7 +787,7 @@
           <a:p>
             <a:fld id="{5BCAD085-E8A6-8845-BD4E-CB4CCA059FC4}" type="datetimeFigureOut">
               <a:rPr lang="en-US" smtClean="0"/>
-              <a:t>6/24/2025</a:t>
+              <a:t>6/25/2025</a:t>
             </a:fld>
             <a:endParaRPr lang="en-US"/>
           </a:p>
@@ -1035,7 +1035,7 @@
           <a:p>
             <a:fld id="{5BCAD085-E8A6-8845-BD4E-CB4CCA059FC4}" type="datetimeFigureOut">
               <a:rPr lang="en-US" smtClean="0"/>
-              <a:t>6/24/2025</a:t>
+              <a:t>6/25/2025</a:t>
             </a:fld>
             <a:endParaRPr lang="en-US"/>
           </a:p>
@@ -1374,7 +1374,7 @@
           <a:p>
             <a:fld id="{5BCAD085-E8A6-8845-BD4E-CB4CCA059FC4}" type="datetimeFigureOut">
               <a:rPr lang="en-US" smtClean="0"/>
-              <a:t>6/24/2025</a:t>
+              <a:t>6/25/2025</a:t>
             </a:fld>
             <a:endParaRPr lang="en-US"/>
           </a:p>
@@ -1721,7 +1721,7 @@
           <a:p>
             <a:fld id="{5BCAD085-E8A6-8845-BD4E-CB4CCA059FC4}" type="datetimeFigureOut">
               <a:rPr lang="en-US" smtClean="0"/>
-              <a:t>6/24/2025</a:t>
+              <a:t>6/25/2025</a:t>
             </a:fld>
             <a:endParaRPr lang="en-US"/>
           </a:p>
@@ -2095,7 +2095,7 @@
           <a:p>
             <a:fld id="{5BCAD085-E8A6-8845-BD4E-CB4CCA059FC4}" type="datetimeFigureOut">
               <a:rPr lang="en-US" smtClean="0"/>
-              <a:t>6/24/2025</a:t>
+              <a:t>6/25/2025</a:t>
             </a:fld>
             <a:endParaRPr lang="en-US"/>
           </a:p>
@@ -2565,7 +2565,7 @@
           <a:p>
             <a:fld id="{5BCAD085-E8A6-8845-BD4E-CB4CCA059FC4}" type="datetimeFigureOut">
               <a:rPr lang="en-US" smtClean="0"/>
-              <a:t>6/24/2025</a:t>
+              <a:t>6/25/2025</a:t>
             </a:fld>
             <a:endParaRPr lang="en-US"/>
           </a:p>
@@ -2770,7 +2770,7 @@
           <a:p>
             <a:fld id="{5BCAD085-E8A6-8845-BD4E-CB4CCA059FC4}" type="datetimeFigureOut">
               <a:rPr lang="en-US" smtClean="0"/>
-              <a:t>6/24/2025</a:t>
+              <a:t>6/25/2025</a:t>
             </a:fld>
             <a:endParaRPr lang="en-US"/>
           </a:p>
@@ -2981,7 +2981,7 @@
           <a:p>
             <a:fld id="{5BCAD085-E8A6-8845-BD4E-CB4CCA059FC4}" type="datetimeFigureOut">
               <a:rPr lang="en-US" smtClean="0"/>
-              <a:t>6/24/2025</a:t>
+              <a:t>6/25/2025</a:t>
             </a:fld>
             <a:endParaRPr lang="en-US"/>
           </a:p>
@@ -3213,7 +3213,7 @@
           <a:p>
             <a:fld id="{5BCAD085-E8A6-8845-BD4E-CB4CCA059FC4}" type="datetimeFigureOut">
               <a:rPr lang="en-US" smtClean="0"/>
-              <a:t>6/24/2025</a:t>
+              <a:t>6/25/2025</a:t>
             </a:fld>
             <a:endParaRPr lang="en-US"/>
           </a:p>
@@ -3461,7 +3461,7 @@
           <a:p>
             <a:fld id="{5BCAD085-E8A6-8845-BD4E-CB4CCA059FC4}" type="datetimeFigureOut">
               <a:rPr lang="en-US" smtClean="0"/>
-              <a:t>6/24/2025</a:t>
+              <a:t>6/25/2025</a:t>
             </a:fld>
             <a:endParaRPr lang="en-US"/>
           </a:p>
@@ -3759,7 +3759,7 @@
           <a:p>
             <a:fld id="{5BCAD085-E8A6-8845-BD4E-CB4CCA059FC4}" type="datetimeFigureOut">
               <a:rPr lang="en-US" smtClean="0"/>
-              <a:t>6/24/2025</a:t>
+              <a:t>6/25/2025</a:t>
             </a:fld>
             <a:endParaRPr lang="en-US"/>
           </a:p>
@@ -4153,7 +4153,7 @@
           <a:p>
             <a:fld id="{5BCAD085-E8A6-8845-BD4E-CB4CCA059FC4}" type="datetimeFigureOut">
               <a:rPr lang="en-US" smtClean="0"/>
-              <a:t>6/24/2025</a:t>
+              <a:t>6/25/2025</a:t>
             </a:fld>
             <a:endParaRPr lang="en-US"/>
           </a:p>
@@ -4302,7 +4302,7 @@
           <a:p>
             <a:fld id="{5BCAD085-E8A6-8845-BD4E-CB4CCA059FC4}" type="datetimeFigureOut">
               <a:rPr lang="en-US" smtClean="0"/>
-              <a:t>6/24/2025</a:t>
+              <a:t>6/25/2025</a:t>
             </a:fld>
             <a:endParaRPr lang="en-US"/>
           </a:p>
@@ -4428,7 +4428,7 @@
           <a:p>
             <a:fld id="{5BCAD085-E8A6-8845-BD4E-CB4CCA059FC4}" type="datetimeFigureOut">
               <a:rPr lang="en-US" smtClean="0"/>
-              <a:t>6/24/2025</a:t>
+              <a:t>6/25/2025</a:t>
             </a:fld>
             <a:endParaRPr lang="en-US"/>
           </a:p>
@@ -4683,7 +4683,7 @@
           <a:p>
             <a:fld id="{5BCAD085-E8A6-8845-BD4E-CB4CCA059FC4}" type="datetimeFigureOut">
               <a:rPr lang="en-US" smtClean="0"/>
-              <a:t>6/24/2025</a:t>
+              <a:t>6/25/2025</a:t>
             </a:fld>
             <a:endParaRPr lang="en-US"/>
           </a:p>
@@ -4998,7 +4998,7 @@
           <a:p>
             <a:fld id="{5BCAD085-E8A6-8845-BD4E-CB4CCA059FC4}" type="datetimeFigureOut">
               <a:rPr lang="en-US" smtClean="0"/>
-              <a:t>6/24/2025</a:t>
+              <a:t>6/25/2025</a:t>
             </a:fld>
             <a:endParaRPr lang="en-US"/>
           </a:p>
@@ -5349,7 +5349,7 @@
           <a:p>
             <a:fld id="{5BCAD085-E8A6-8845-BD4E-CB4CCA059FC4}" type="datetimeFigureOut">
               <a:rPr lang="en-US" smtClean="0"/>
-              <a:t>6/24/2025</a:t>
+              <a:t>6/25/2025</a:t>
             </a:fld>
             <a:endParaRPr lang="en-US"/>
           </a:p>
@@ -5908,6 +5908,7 @@
           <a:lstStyle/>
           <a:p>
             <a:r>
+              <a:rPr dirty="0"/>
               <a:t>What is a Constant?</a:t>
             </a:r>
           </a:p>
@@ -5929,8 +5930,10 @@
           <a:lstStyle/>
           <a:p>
             <a:r>
-              <a:t>Auto-generated Presentation</a:t>
-            </a:r>
+              <a:rPr lang="en-US" dirty="0"/>
+              <a:t>Golang Interview Questions</a:t>
+            </a:r>
+            <a:endParaRPr dirty="0"/>
           </a:p>
         </p:txBody>
       </p:sp>
@@ -6547,7 +6550,7 @@
         </p:nvSpPr>
         <p:spPr>
           <a:xfrm>
-            <a:off x="971552" y="545330"/>
+            <a:off x="971552" y="266724"/>
             <a:ext cx="7200897" cy="977900"/>
           </a:xfrm>
         </p:spPr>
@@ -6570,8 +6573,8 @@
         </p:nvSpPr>
         <p:spPr>
           <a:xfrm>
-            <a:off x="971551" y="1523230"/>
-            <a:ext cx="7650955" cy="2554545"/>
+            <a:off x="864394" y="1087461"/>
+            <a:ext cx="7650955" cy="3539430"/>
           </a:xfrm>
           <a:prstGeom prst="rect">
             <a:avLst/>
@@ -6589,7 +6592,7 @@
             <a:endParaRPr sz="1600" dirty="0"/>
           </a:p>
           <a:p>
-            <a:pPr algn="l">
+            <a:pPr>
               <a:defRPr sz="2400">
                 <a:solidFill>
                   <a:srgbClr val="FFFFFF"/>
@@ -6611,6 +6614,59 @@
               <a:rPr sz="1600" dirty="0"/>
               <a:t>```go</a:t>
             </a:r>
+            <a:endParaRPr lang="en-US" sz="1600" dirty="0"/>
+          </a:p>
+          <a:p>
+            <a:pPr>
+              <a:defRPr sz="2400">
+                <a:solidFill>
+                  <a:srgbClr val="FFFFFF"/>
+                </a:solidFill>
+                <a:latin typeface="Courier New"/>
+              </a:defRPr>
+            </a:pPr>
+            <a:r>
+              <a:rPr lang="en-US" sz="1600" dirty="0"/>
+              <a:t>const A = 1  </a:t>
+            </a:r>
+          </a:p>
+          <a:p>
+            <a:pPr>
+              <a:defRPr sz="2400">
+                <a:solidFill>
+                  <a:srgbClr val="FFFFFF"/>
+                </a:solidFill>
+                <a:latin typeface="Courier New"/>
+              </a:defRPr>
+            </a:pPr>
+            <a:r>
+              <a:rPr lang="en-US" sz="1600" dirty="0"/>
+              <a:t>const B = 2  </a:t>
+            </a:r>
+          </a:p>
+          <a:p>
+            <a:pPr>
+              <a:defRPr sz="2400">
+                <a:solidFill>
+                  <a:srgbClr val="FFFFFF"/>
+                </a:solidFill>
+                <a:latin typeface="Courier New"/>
+              </a:defRPr>
+            </a:pPr>
+            <a:r>
+              <a:rPr lang="en-US" sz="1600" dirty="0"/>
+              <a:t>const C = 3</a:t>
+            </a:r>
+          </a:p>
+          <a:p>
+            <a:pPr>
+              <a:defRPr sz="2400">
+                <a:solidFill>
+                  <a:srgbClr val="FFFFFF"/>
+                </a:solidFill>
+                <a:latin typeface="Courier New"/>
+              </a:defRPr>
+            </a:pPr>
             <a:br>
               <a:rPr sz="1600" dirty="0"/>
             </a:br>
@@ -6736,12 +6792,19 @@
             <p:ph idx="1"/>
           </p:nvPr>
         </p:nvSpPr>
-        <p:spPr/>
-        <p:txBody>
-          <a:bodyPr wrap="square"/>
-          <a:lstStyle/>
-          <a:p>
-            <a:endParaRPr dirty="0"/>
+        <p:spPr>
+          <a:xfrm>
+            <a:off x="1042990" y="1511300"/>
+            <a:ext cx="7200897" cy="2489202"/>
+          </a:xfrm>
+        </p:spPr>
+        <p:txBody>
+          <a:bodyPr wrap="square">
+            <a:noAutofit/>
+          </a:bodyPr>
+          <a:lstStyle/>
+          <a:p>
+            <a:endParaRPr sz="2800" dirty="0"/>
           </a:p>
           <a:p>
             <a:pPr>
@@ -6752,7 +6815,7 @@
               </a:defRPr>
             </a:pPr>
             <a:r>
-              <a:rPr dirty="0"/>
+              <a:rPr sz="2800" dirty="0"/>
               <a:t>Untyped constants are more flexible because their type is inferred based on usage.</a:t>
             </a:r>
           </a:p>
@@ -6764,18 +6827,8 @@
                 </a:solidFill>
               </a:defRPr>
             </a:pPr>
-            <a:endParaRPr dirty="0"/>
-          </a:p>
-          <a:p>
-            <a:pPr>
-              <a:defRPr sz="1800">
-                <a:solidFill>
-                  <a:srgbClr val="000000"/>
-                </a:solidFill>
-              </a:defRPr>
-            </a:pPr>
-            <a:r>
-              <a:rPr dirty="0"/>
+            <a:r>
+              <a:rPr sz="2800" dirty="0"/>
               <a:t>Typed constants have a fixed type and cannot be assigned to variables of a different type without conversion.</a:t>
             </a:r>
           </a:p>

</xml_diff>